<commit_message>
ajout doc bas niveau
</commit_message>
<xml_diff>
--- a/hardware/Interconnexions/DocCarteInterconnexions.pptx
+++ b/hardware/Interconnexions/DocCarteInterconnexions.pptx
@@ -244,7 +244,7 @@
           <a:p>
             <a:fld id="{9FEA0911-2648-4587-91E9-DF68751CD790}" type="datetimeFigureOut">
               <a:rPr lang="fr-FR" smtClean="0"/>
-              <a:t>10/03/2015</a:t>
+              <a:t>16/03/2015</a:t>
             </a:fld>
             <a:endParaRPr lang="fr-FR" dirty="0"/>
           </a:p>
@@ -414,7 +414,7 @@
           <a:p>
             <a:fld id="{9FEA0911-2648-4587-91E9-DF68751CD790}" type="datetimeFigureOut">
               <a:rPr lang="fr-FR" smtClean="0"/>
-              <a:t>10/03/2015</a:t>
+              <a:t>16/03/2015</a:t>
             </a:fld>
             <a:endParaRPr lang="fr-FR" dirty="0"/>
           </a:p>
@@ -594,7 +594,7 @@
           <a:p>
             <a:fld id="{9FEA0911-2648-4587-91E9-DF68751CD790}" type="datetimeFigureOut">
               <a:rPr lang="fr-FR" smtClean="0"/>
-              <a:t>10/03/2015</a:t>
+              <a:t>16/03/2015</a:t>
             </a:fld>
             <a:endParaRPr lang="fr-FR" dirty="0"/>
           </a:p>
@@ -764,7 +764,7 @@
           <a:p>
             <a:fld id="{9FEA0911-2648-4587-91E9-DF68751CD790}" type="datetimeFigureOut">
               <a:rPr lang="fr-FR" smtClean="0"/>
-              <a:t>10/03/2015</a:t>
+              <a:t>16/03/2015</a:t>
             </a:fld>
             <a:endParaRPr lang="fr-FR" dirty="0"/>
           </a:p>
@@ -1008,7 +1008,7 @@
           <a:p>
             <a:fld id="{9FEA0911-2648-4587-91E9-DF68751CD790}" type="datetimeFigureOut">
               <a:rPr lang="fr-FR" smtClean="0"/>
-              <a:t>10/03/2015</a:t>
+              <a:t>16/03/2015</a:t>
             </a:fld>
             <a:endParaRPr lang="fr-FR" dirty="0"/>
           </a:p>
@@ -1240,7 +1240,7 @@
           <a:p>
             <a:fld id="{9FEA0911-2648-4587-91E9-DF68751CD790}" type="datetimeFigureOut">
               <a:rPr lang="fr-FR" smtClean="0"/>
-              <a:t>10/03/2015</a:t>
+              <a:t>16/03/2015</a:t>
             </a:fld>
             <a:endParaRPr lang="fr-FR" dirty="0"/>
           </a:p>
@@ -1607,7 +1607,7 @@
           <a:p>
             <a:fld id="{9FEA0911-2648-4587-91E9-DF68751CD790}" type="datetimeFigureOut">
               <a:rPr lang="fr-FR" smtClean="0"/>
-              <a:t>10/03/2015</a:t>
+              <a:t>16/03/2015</a:t>
             </a:fld>
             <a:endParaRPr lang="fr-FR" dirty="0"/>
           </a:p>
@@ -1725,7 +1725,7 @@
           <a:p>
             <a:fld id="{9FEA0911-2648-4587-91E9-DF68751CD790}" type="datetimeFigureOut">
               <a:rPr lang="fr-FR" smtClean="0"/>
-              <a:t>10/03/2015</a:t>
+              <a:t>16/03/2015</a:t>
             </a:fld>
             <a:endParaRPr lang="fr-FR" dirty="0"/>
           </a:p>
@@ -1820,7 +1820,7 @@
           <a:p>
             <a:fld id="{9FEA0911-2648-4587-91E9-DF68751CD790}" type="datetimeFigureOut">
               <a:rPr lang="fr-FR" smtClean="0"/>
-              <a:t>10/03/2015</a:t>
+              <a:t>16/03/2015</a:t>
             </a:fld>
             <a:endParaRPr lang="fr-FR" dirty="0"/>
           </a:p>
@@ -2097,7 +2097,7 @@
           <a:p>
             <a:fld id="{9FEA0911-2648-4587-91E9-DF68751CD790}" type="datetimeFigureOut">
               <a:rPr lang="fr-FR" smtClean="0"/>
-              <a:t>10/03/2015</a:t>
+              <a:t>16/03/2015</a:t>
             </a:fld>
             <a:endParaRPr lang="fr-FR" dirty="0"/>
           </a:p>
@@ -2354,7 +2354,7 @@
           <a:p>
             <a:fld id="{9FEA0911-2648-4587-91E9-DF68751CD790}" type="datetimeFigureOut">
               <a:rPr lang="fr-FR" smtClean="0"/>
-              <a:t>10/03/2015</a:t>
+              <a:t>16/03/2015</a:t>
             </a:fld>
             <a:endParaRPr lang="fr-FR" dirty="0"/>
           </a:p>
@@ -2567,7 +2567,7 @@
           <a:p>
             <a:fld id="{9FEA0911-2648-4587-91E9-DF68751CD790}" type="datetimeFigureOut">
               <a:rPr lang="fr-FR" smtClean="0"/>
-              <a:t>10/03/2015</a:t>
+              <a:t>16/03/2015</a:t>
             </a:fld>
             <a:endParaRPr lang="fr-FR" dirty="0"/>
           </a:p>
@@ -8591,6 +8591,135 @@
           <a:chExt cx="0" cy="0"/>
         </a:xfrm>
       </p:grpSpPr>
+      <p:sp>
+        <p:nvSpPr>
+          <p:cNvPr id="156" name="ZoneTexte 155"/>
+          <p:cNvSpPr txBox="1"/>
+          <p:nvPr/>
+        </p:nvSpPr>
+        <p:spPr>
+          <a:xfrm>
+            <a:off x="7446274" y="901870"/>
+            <a:ext cx="868892" cy="276999"/>
+          </a:xfrm>
+          <a:prstGeom prst="rect">
+            <a:avLst/>
+          </a:prstGeom>
+        </p:spPr>
+        <p:style>
+          <a:lnRef idx="2">
+            <a:schemeClr val="accent4"/>
+          </a:lnRef>
+          <a:fillRef idx="1">
+            <a:schemeClr val="lt1"/>
+          </a:fillRef>
+          <a:effectRef idx="0">
+            <a:schemeClr val="accent4"/>
+          </a:effectRef>
+          <a:fontRef idx="minor">
+            <a:schemeClr val="dk1"/>
+          </a:fontRef>
+        </p:style>
+        <p:txBody>
+          <a:bodyPr wrap="none" rtlCol="0">
+            <a:spAutoFit/>
+          </a:bodyPr>
+          <a:lstStyle/>
+          <a:p>
+            <a:r>
+              <a:rPr lang="fr-FR" sz="1200" b="1" dirty="0" smtClean="0"/>
+              <a:t>Extensions</a:t>
+            </a:r>
+            <a:endParaRPr lang="fr-FR" sz="1200" b="1" dirty="0"/>
+          </a:p>
+        </p:txBody>
+      </p:sp>
+      <p:sp>
+        <p:nvSpPr>
+          <p:cNvPr id="11" name="ZoneTexte 10"/>
+          <p:cNvSpPr txBox="1"/>
+          <p:nvPr/>
+        </p:nvSpPr>
+        <p:spPr>
+          <a:xfrm>
+            <a:off x="6724531" y="904744"/>
+            <a:ext cx="631776" cy="276999"/>
+          </a:xfrm>
+          <a:prstGeom prst="rect">
+            <a:avLst/>
+          </a:prstGeom>
+        </p:spPr>
+        <p:style>
+          <a:lnRef idx="2">
+            <a:schemeClr val="accent6"/>
+          </a:lnRef>
+          <a:fillRef idx="1">
+            <a:schemeClr val="lt1"/>
+          </a:fillRef>
+          <a:effectRef idx="0">
+            <a:schemeClr val="accent6"/>
+          </a:effectRef>
+          <a:fontRef idx="minor">
+            <a:schemeClr val="dk1"/>
+          </a:fontRef>
+        </p:style>
+        <p:txBody>
+          <a:bodyPr wrap="none" rtlCol="0">
+            <a:spAutoFit/>
+          </a:bodyPr>
+          <a:lstStyle/>
+          <a:p>
+            <a:r>
+              <a:rPr lang="fr-FR" sz="1200" b="1" dirty="0" smtClean="0"/>
+              <a:t>Arrière</a:t>
+            </a:r>
+            <a:endParaRPr lang="fr-FR" sz="1200" b="1" dirty="0"/>
+          </a:p>
+        </p:txBody>
+      </p:sp>
+      <p:sp>
+        <p:nvSpPr>
+          <p:cNvPr id="8" name="ZoneTexte 7"/>
+          <p:cNvSpPr txBox="1"/>
+          <p:nvPr/>
+        </p:nvSpPr>
+        <p:spPr>
+          <a:xfrm>
+            <a:off x="8744045" y="907418"/>
+            <a:ext cx="553934" cy="276999"/>
+          </a:xfrm>
+          <a:prstGeom prst="rect">
+            <a:avLst/>
+          </a:prstGeom>
+        </p:spPr>
+        <p:style>
+          <a:lnRef idx="2">
+            <a:schemeClr val="accent1"/>
+          </a:lnRef>
+          <a:fillRef idx="1">
+            <a:schemeClr val="lt1"/>
+          </a:fillRef>
+          <a:effectRef idx="0">
+            <a:schemeClr val="accent1"/>
+          </a:effectRef>
+          <a:fontRef idx="minor">
+            <a:schemeClr val="dk1"/>
+          </a:fontRef>
+        </p:style>
+        <p:txBody>
+          <a:bodyPr wrap="none" rtlCol="0">
+            <a:spAutoFit/>
+          </a:bodyPr>
+          <a:lstStyle/>
+          <a:p>
+            <a:r>
+              <a:rPr lang="fr-FR" sz="1200" b="1" dirty="0" smtClean="0"/>
+              <a:t>Avant</a:t>
+            </a:r>
+            <a:endParaRPr lang="fr-FR" sz="1200" b="1" dirty="0"/>
+          </a:p>
+        </p:txBody>
+      </p:sp>
       <p:pic>
         <p:nvPicPr>
           <p:cNvPr id="2" name="Image 1"/>
@@ -8620,6 +8749,363 @@
           </a:prstGeom>
         </p:spPr>
       </p:pic>
+      <p:grpSp>
+        <p:nvGrpSpPr>
+          <p:cNvPr id="160" name="Groupe 159"/>
+          <p:cNvGrpSpPr/>
+          <p:nvPr/>
+        </p:nvGrpSpPr>
+        <p:grpSpPr>
+          <a:xfrm>
+            <a:off x="1348400" y="1440000"/>
+            <a:ext cx="445870" cy="144000"/>
+            <a:chOff x="534965" y="1440000"/>
+            <a:chExt cx="445870" cy="144000"/>
+          </a:xfrm>
+        </p:grpSpPr>
+        <p:sp>
+          <p:nvSpPr>
+            <p:cNvPr id="161" name="Rectangle 160"/>
+            <p:cNvSpPr/>
+            <p:nvPr/>
+          </p:nvSpPr>
+          <p:spPr>
+            <a:xfrm>
+              <a:off x="764835" y="1440000"/>
+              <a:ext cx="216000" cy="144000"/>
+            </a:xfrm>
+            <a:prstGeom prst="rect">
+              <a:avLst/>
+            </a:prstGeom>
+            <a:solidFill>
+              <a:schemeClr val="accent2">
+                <a:lumMod val="75000"/>
+              </a:schemeClr>
+            </a:solidFill>
+            <a:ln>
+              <a:solidFill>
+                <a:schemeClr val="accent2">
+                  <a:lumMod val="50000"/>
+                </a:schemeClr>
+              </a:solidFill>
+            </a:ln>
+          </p:spPr>
+          <p:style>
+            <a:lnRef idx="2">
+              <a:schemeClr val="accent1">
+                <a:shade val="50000"/>
+              </a:schemeClr>
+            </a:lnRef>
+            <a:fillRef idx="1">
+              <a:schemeClr val="accent1"/>
+            </a:fillRef>
+            <a:effectRef idx="0">
+              <a:schemeClr val="accent1"/>
+            </a:effectRef>
+            <a:fontRef idx="minor">
+              <a:schemeClr val="lt1"/>
+            </a:fontRef>
+          </p:style>
+          <p:txBody>
+            <a:bodyPr rtlCol="0" anchor="ctr"/>
+            <a:lstStyle/>
+            <a:p>
+              <a:pPr algn="ctr"/>
+              <a:endParaRPr lang="fr-FR"/>
+            </a:p>
+          </p:txBody>
+        </p:sp>
+        <p:sp>
+          <p:nvSpPr>
+            <p:cNvPr id="162" name="Rectangle 161"/>
+            <p:cNvSpPr/>
+            <p:nvPr/>
+          </p:nvSpPr>
+          <p:spPr>
+            <a:xfrm>
+              <a:off x="534965" y="1440000"/>
+              <a:ext cx="216000" cy="144000"/>
+            </a:xfrm>
+            <a:prstGeom prst="rect">
+              <a:avLst/>
+            </a:prstGeom>
+            <a:solidFill>
+              <a:schemeClr val="accent5">
+                <a:lumMod val="75000"/>
+              </a:schemeClr>
+            </a:solidFill>
+            <a:ln>
+              <a:solidFill>
+                <a:schemeClr val="accent5">
+                  <a:lumMod val="50000"/>
+                </a:schemeClr>
+              </a:solidFill>
+            </a:ln>
+          </p:spPr>
+          <p:style>
+            <a:lnRef idx="2">
+              <a:schemeClr val="accent1">
+                <a:shade val="50000"/>
+              </a:schemeClr>
+            </a:lnRef>
+            <a:fillRef idx="1">
+              <a:schemeClr val="accent1"/>
+            </a:fillRef>
+            <a:effectRef idx="0">
+              <a:schemeClr val="accent1"/>
+            </a:effectRef>
+            <a:fontRef idx="minor">
+              <a:schemeClr val="lt1"/>
+            </a:fontRef>
+          </p:style>
+          <p:txBody>
+            <a:bodyPr rtlCol="0" anchor="ctr"/>
+            <a:lstStyle/>
+            <a:p>
+              <a:pPr algn="ctr"/>
+              <a:endParaRPr lang="fr-FR"/>
+            </a:p>
+          </p:txBody>
+        </p:sp>
+      </p:grpSp>
+      <p:grpSp>
+        <p:nvGrpSpPr>
+          <p:cNvPr id="163" name="Groupe 162"/>
+          <p:cNvGrpSpPr/>
+          <p:nvPr/>
+        </p:nvGrpSpPr>
+        <p:grpSpPr>
+          <a:xfrm>
+            <a:off x="2155485" y="1440000"/>
+            <a:ext cx="445235" cy="144000"/>
+            <a:chOff x="509565" y="1440000"/>
+            <a:chExt cx="445235" cy="144000"/>
+          </a:xfrm>
+        </p:grpSpPr>
+        <p:sp>
+          <p:nvSpPr>
+            <p:cNvPr id="164" name="Rectangle 163"/>
+            <p:cNvSpPr/>
+            <p:nvPr/>
+          </p:nvSpPr>
+          <p:spPr>
+            <a:xfrm>
+              <a:off x="509565" y="1440000"/>
+              <a:ext cx="216000" cy="144000"/>
+            </a:xfrm>
+            <a:prstGeom prst="rect">
+              <a:avLst/>
+            </a:prstGeom>
+            <a:solidFill>
+              <a:schemeClr val="accent2">
+                <a:lumMod val="75000"/>
+              </a:schemeClr>
+            </a:solidFill>
+            <a:ln>
+              <a:solidFill>
+                <a:schemeClr val="accent2">
+                  <a:lumMod val="50000"/>
+                </a:schemeClr>
+              </a:solidFill>
+            </a:ln>
+          </p:spPr>
+          <p:style>
+            <a:lnRef idx="2">
+              <a:schemeClr val="accent1">
+                <a:shade val="50000"/>
+              </a:schemeClr>
+            </a:lnRef>
+            <a:fillRef idx="1">
+              <a:schemeClr val="accent1"/>
+            </a:fillRef>
+            <a:effectRef idx="0">
+              <a:schemeClr val="accent1"/>
+            </a:effectRef>
+            <a:fontRef idx="minor">
+              <a:schemeClr val="lt1"/>
+            </a:fontRef>
+          </p:style>
+          <p:txBody>
+            <a:bodyPr rtlCol="0" anchor="ctr"/>
+            <a:lstStyle/>
+            <a:p>
+              <a:pPr algn="ctr"/>
+              <a:endParaRPr lang="fr-FR"/>
+            </a:p>
+          </p:txBody>
+        </p:sp>
+        <p:sp>
+          <p:nvSpPr>
+            <p:cNvPr id="165" name="Rectangle 164"/>
+            <p:cNvSpPr/>
+            <p:nvPr/>
+          </p:nvSpPr>
+          <p:spPr>
+            <a:xfrm>
+              <a:off x="738800" y="1440000"/>
+              <a:ext cx="216000" cy="144000"/>
+            </a:xfrm>
+            <a:prstGeom prst="rect">
+              <a:avLst/>
+            </a:prstGeom>
+            <a:solidFill>
+              <a:schemeClr val="accent5">
+                <a:lumMod val="75000"/>
+              </a:schemeClr>
+            </a:solidFill>
+            <a:ln>
+              <a:solidFill>
+                <a:schemeClr val="accent5">
+                  <a:lumMod val="50000"/>
+                </a:schemeClr>
+              </a:solidFill>
+            </a:ln>
+          </p:spPr>
+          <p:style>
+            <a:lnRef idx="2">
+              <a:schemeClr val="accent1">
+                <a:shade val="50000"/>
+              </a:schemeClr>
+            </a:lnRef>
+            <a:fillRef idx="1">
+              <a:schemeClr val="accent1"/>
+            </a:fillRef>
+            <a:effectRef idx="0">
+              <a:schemeClr val="accent1"/>
+            </a:effectRef>
+            <a:fontRef idx="minor">
+              <a:schemeClr val="lt1"/>
+            </a:fontRef>
+          </p:style>
+          <p:txBody>
+            <a:bodyPr rtlCol="0" anchor="ctr"/>
+            <a:lstStyle/>
+            <a:p>
+              <a:pPr algn="ctr"/>
+              <a:endParaRPr lang="fr-FR"/>
+            </a:p>
+          </p:txBody>
+        </p:sp>
+      </p:grpSp>
+      <p:grpSp>
+        <p:nvGrpSpPr>
+          <p:cNvPr id="13" name="Groupe 12"/>
+          <p:cNvGrpSpPr/>
+          <p:nvPr/>
+        </p:nvGrpSpPr>
+        <p:grpSpPr>
+          <a:xfrm>
+            <a:off x="509565" y="1440000"/>
+            <a:ext cx="445235" cy="144000"/>
+            <a:chOff x="509565" y="1440000"/>
+            <a:chExt cx="445235" cy="144000"/>
+          </a:xfrm>
+        </p:grpSpPr>
+        <p:sp>
+          <p:nvSpPr>
+            <p:cNvPr id="12" name="Rectangle 11"/>
+            <p:cNvSpPr/>
+            <p:nvPr/>
+          </p:nvSpPr>
+          <p:spPr>
+            <a:xfrm>
+              <a:off x="509565" y="1440000"/>
+              <a:ext cx="216000" cy="144000"/>
+            </a:xfrm>
+            <a:prstGeom prst="rect">
+              <a:avLst/>
+            </a:prstGeom>
+            <a:solidFill>
+              <a:schemeClr val="accent2">
+                <a:lumMod val="75000"/>
+              </a:schemeClr>
+            </a:solidFill>
+            <a:ln>
+              <a:solidFill>
+                <a:schemeClr val="accent2">
+                  <a:lumMod val="50000"/>
+                </a:schemeClr>
+              </a:solidFill>
+            </a:ln>
+          </p:spPr>
+          <p:style>
+            <a:lnRef idx="2">
+              <a:schemeClr val="accent1">
+                <a:shade val="50000"/>
+              </a:schemeClr>
+            </a:lnRef>
+            <a:fillRef idx="1">
+              <a:schemeClr val="accent1"/>
+            </a:fillRef>
+            <a:effectRef idx="0">
+              <a:schemeClr val="accent1"/>
+            </a:effectRef>
+            <a:fontRef idx="minor">
+              <a:schemeClr val="lt1"/>
+            </a:fontRef>
+          </p:style>
+          <p:txBody>
+            <a:bodyPr rtlCol="0" anchor="ctr"/>
+            <a:lstStyle/>
+            <a:p>
+              <a:pPr algn="ctr"/>
+              <a:endParaRPr lang="fr-FR"/>
+            </a:p>
+          </p:txBody>
+        </p:sp>
+        <p:sp>
+          <p:nvSpPr>
+            <p:cNvPr id="159" name="Rectangle 158"/>
+            <p:cNvSpPr/>
+            <p:nvPr/>
+          </p:nvSpPr>
+          <p:spPr>
+            <a:xfrm>
+              <a:off x="738800" y="1440000"/>
+              <a:ext cx="216000" cy="144000"/>
+            </a:xfrm>
+            <a:prstGeom prst="rect">
+              <a:avLst/>
+            </a:prstGeom>
+            <a:solidFill>
+              <a:schemeClr val="accent5">
+                <a:lumMod val="75000"/>
+              </a:schemeClr>
+            </a:solidFill>
+            <a:ln>
+              <a:solidFill>
+                <a:schemeClr val="accent5">
+                  <a:lumMod val="50000"/>
+                </a:schemeClr>
+              </a:solidFill>
+            </a:ln>
+          </p:spPr>
+          <p:style>
+            <a:lnRef idx="2">
+              <a:schemeClr val="accent1">
+                <a:shade val="50000"/>
+              </a:schemeClr>
+            </a:lnRef>
+            <a:fillRef idx="1">
+              <a:schemeClr val="accent1"/>
+            </a:fillRef>
+            <a:effectRef idx="0">
+              <a:schemeClr val="accent1"/>
+            </a:effectRef>
+            <a:fontRef idx="minor">
+              <a:schemeClr val="lt1"/>
+            </a:fontRef>
+          </p:style>
+          <p:txBody>
+            <a:bodyPr rtlCol="0" anchor="ctr"/>
+            <a:lstStyle/>
+            <a:p>
+              <a:pPr algn="ctr"/>
+              <a:endParaRPr lang="fr-FR"/>
+            </a:p>
+          </p:txBody>
+        </p:sp>
+      </p:grpSp>
       <p:cxnSp>
         <p:nvCxnSpPr>
           <p:cNvPr id="7" name="Connecteur en angle 6"/>
@@ -13547,6 +14033,92 @@
               <a:latin typeface="Courier New" panose="02070309020205020404" pitchFamily="49" charset="0"/>
               <a:cs typeface="Courier New" panose="02070309020205020404" pitchFamily="49" charset="0"/>
             </a:endParaRPr>
+          </a:p>
+        </p:txBody>
+      </p:sp>
+      <p:sp>
+        <p:nvSpPr>
+          <p:cNvPr id="157" name="ZoneTexte 156"/>
+          <p:cNvSpPr txBox="1"/>
+          <p:nvPr/>
+        </p:nvSpPr>
+        <p:spPr>
+          <a:xfrm>
+            <a:off x="7889030" y="4510201"/>
+            <a:ext cx="838691" cy="276999"/>
+          </a:xfrm>
+          <a:prstGeom prst="rect">
+            <a:avLst/>
+          </a:prstGeom>
+        </p:spPr>
+        <p:style>
+          <a:lnRef idx="2">
+            <a:schemeClr val="accent3"/>
+          </a:lnRef>
+          <a:fillRef idx="1">
+            <a:schemeClr val="lt1"/>
+          </a:fillRef>
+          <a:effectRef idx="0">
+            <a:schemeClr val="accent3"/>
+          </a:effectRef>
+          <a:fontRef idx="minor">
+            <a:schemeClr val="dk1"/>
+          </a:fontRef>
+        </p:style>
+        <p:txBody>
+          <a:bodyPr wrap="none" rtlCol="0">
+            <a:spAutoFit/>
+          </a:bodyPr>
+          <a:lstStyle/>
+          <a:p>
+            <a:r>
+              <a:rPr lang="fr-FR" sz="1200" b="1" dirty="0" smtClean="0"/>
+              <a:t>Ascenseur</a:t>
+            </a:r>
+            <a:endParaRPr lang="fr-FR" sz="1200" b="1" dirty="0"/>
+          </a:p>
+        </p:txBody>
+      </p:sp>
+      <p:sp>
+        <p:nvSpPr>
+          <p:cNvPr id="158" name="ZoneTexte 157"/>
+          <p:cNvSpPr txBox="1"/>
+          <p:nvPr/>
+        </p:nvSpPr>
+        <p:spPr>
+          <a:xfrm>
+            <a:off x="5280980" y="4550461"/>
+            <a:ext cx="659155" cy="276999"/>
+          </a:xfrm>
+          <a:prstGeom prst="rect">
+            <a:avLst/>
+          </a:prstGeom>
+        </p:spPr>
+        <p:style>
+          <a:lnRef idx="2">
+            <a:schemeClr val="accent5"/>
+          </a:lnRef>
+          <a:fillRef idx="1">
+            <a:schemeClr val="lt1"/>
+          </a:fillRef>
+          <a:effectRef idx="0">
+            <a:schemeClr val="accent5"/>
+          </a:effectRef>
+          <a:fontRef idx="minor">
+            <a:schemeClr val="dk1"/>
+          </a:fontRef>
+        </p:style>
+        <p:txBody>
+          <a:bodyPr wrap="none" rtlCol="0">
+            <a:spAutoFit/>
+          </a:bodyPr>
+          <a:lstStyle/>
+          <a:p>
+            <a:r>
+              <a:rPr lang="fr-FR" sz="1200" b="1" dirty="0" err="1" smtClean="0"/>
+              <a:t>Jumper</a:t>
+            </a:r>
+            <a:endParaRPr lang="fr-FR" sz="1200" b="1" dirty="0"/>
           </a:p>
         </p:txBody>
       </p:sp>

</xml_diff>